<commit_message>
Update Sorting algorithms PPT
</commit_message>
<xml_diff>
--- a/M02_Search_and_Sorting_Algorithms/01 Presentacion/M02_PPT-Search and Sorting algorithms.pptx
+++ b/M02_Search_and_Sorting_Algorithms/01 Presentacion/M02_PPT-Search and Sorting algorithms.pptx
@@ -265,7 +265,7 @@
           <a:p>
             <a:fld id="{502DC4F2-4218-4162-BA3D-B14DE8F619FF}" type="datetimeFigureOut">
               <a:rPr lang="en-US" smtClean="0"/>
-              <a:t>1/26/24</a:t>
+              <a:t>1/31/24</a:t>
             </a:fld>
             <a:endParaRPr lang="en-US"/>
           </a:p>
@@ -6982,7 +6982,7 @@
           <a:p>
             <a:r>
               <a:rPr lang="es-MX" b="1" dirty="0"/>
-              <a:t>Antes</a:t>
+              <a:t>Before</a:t>
             </a:r>
             <a:endParaRPr lang="en-US" b="1" dirty="0"/>
           </a:p>
@@ -7017,8 +7017,8 @@
           <a:lstStyle/>
           <a:p>
             <a:r>
-              <a:rPr lang="es-MX" b="1" dirty="0"/>
-              <a:t>Después</a:t>
+              <a:rPr lang="es-MX" b="1"/>
+              <a:t>After</a:t>
             </a:r>
             <a:endParaRPr lang="en-US" b="1" dirty="0"/>
           </a:p>

</xml_diff>